<commit_message>
update one figure in optimization.tex
</commit_message>
<xml_diff>
--- a/other/MinEnergy.pptx
+++ b/other/MinEnergy.pptx
@@ -119,10 +119,10 @@
           <c:layoutTarget val="inner"/>
           <c:xMode val="edge"/>
           <c:yMode val="edge"/>
-          <c:x val="0.12930796150481189"/>
+          <c:x val="0.1438403169631044"/>
           <c:y val="5.1400554097404488E-2"/>
-          <c:w val="0.81685870516185477"/>
-          <c:h val="0.68311193658932234"/>
+          <c:w val="0.8023265892853304"/>
+          <c:h val="0.6405412574311613"/>
         </c:manualLayout>
       </c:layout>
       <c:lineChart>
@@ -132,7 +132,7 @@
           <c:order val="0"/>
           <c:tx>
             <c:strRef>
-              <c:f>[1]Write!$C$83</c:f>
+              <c:f>'D:\My research\Non-volatile Memory\MRAM\Qualcomm\SimResults\A\[All_Data_Column_A.xlsx]Write'!$C$83</c:f>
               <c:strCache>
                 <c:ptCount val="1"/>
                 <c:pt idx="0">
@@ -150,7 +150,7 @@
           </c:marker>
           <c:cat>
             <c:strRef>
-              <c:f>[1]Write!$B$84:$B$92</c:f>
+              <c:f>'D:\My research\Non-volatile Memory\MRAM\Qualcomm\SimResults\A\[All_Data_Column_A.xlsx]Write'!$B$84:$B$92</c:f>
               <c:strCache>
                 <c:ptCount val="9"/>
                 <c:pt idx="0">
@@ -185,7 +185,7 @@
           </c:cat>
           <c:val>
             <c:numRef>
-              <c:f>[1]Write!$C$84:$C$92</c:f>
+              <c:f>'D:\My research\Non-volatile Memory\MRAM\Qualcomm\SimResults\A\[All_Data_Column_A.xlsx]Write'!$C$84:$C$92</c:f>
               <c:numCache>
                 <c:formatCode>General</c:formatCode>
                 <c:ptCount val="9"/>
@@ -225,7 +225,7 @@
           <c:order val="1"/>
           <c:tx>
             <c:strRef>
-              <c:f>[1]Write!$D$83</c:f>
+              <c:f>'D:\My research\Non-volatile Memory\MRAM\Qualcomm\SimResults\A\[All_Data_Column_A.xlsx]Write'!$D$83</c:f>
               <c:strCache>
                 <c:ptCount val="1"/>
                 <c:pt idx="0">
@@ -258,7 +258,7 @@
           </c:marker>
           <c:cat>
             <c:strRef>
-              <c:f>[1]Write!$B$84:$B$92</c:f>
+              <c:f>'D:\My research\Non-volatile Memory\MRAM\Qualcomm\SimResults\A\[All_Data_Column_A.xlsx]Write'!$B$84:$B$92</c:f>
               <c:strCache>
                 <c:ptCount val="9"/>
                 <c:pt idx="0">
@@ -293,7 +293,7 @@
           </c:cat>
           <c:val>
             <c:numRef>
-              <c:f>[1]Write!$D$84:$D$92</c:f>
+              <c:f>'D:\My research\Non-volatile Memory\MRAM\Qualcomm\SimResults\A\[All_Data_Column_A.xlsx]Write'!$D$84:$D$92</c:f>
               <c:numCache>
                 <c:formatCode>General</c:formatCode>
                 <c:ptCount val="9"/>
@@ -329,11 +329,11 @@
           </c:val>
         </c:ser>
         <c:marker val="1"/>
-        <c:axId val="98656256"/>
-        <c:axId val="98659328"/>
+        <c:axId val="90408064"/>
+        <c:axId val="90410368"/>
       </c:lineChart>
       <c:catAx>
-        <c:axId val="98656256"/>
+        <c:axId val="90408064"/>
         <c:scaling>
           <c:orientation val="minMax"/>
         </c:scaling>
@@ -349,7 +349,7 @@
                 </a:pPr>
                 <a:r>
                   <a:rPr lang="en-US" sz="1400"/>
-                  <a:t>STT-RAM Macro Capacity</a:t>
+                  <a:t>Capacity</a:t>
                 </a:r>
               </a:p>
             </c:rich>
@@ -358,8 +358,8 @@
             <c:manualLayout>
               <c:xMode val="edge"/>
               <c:yMode val="edge"/>
-              <c:x val="0.31270252235419732"/>
-              <c:y val="0.91130242825607066"/>
+              <c:x val="0.38920528376575908"/>
+              <c:y val="0.90534746760895168"/>
             </c:manualLayout>
           </c:layout>
         </c:title>
@@ -370,22 +370,22 @@
           <a:lstStyle/>
           <a:p>
             <a:pPr>
-              <a:defRPr sz="1200"/>
+              <a:defRPr sz="1050"/>
             </a:pPr>
             <a:endParaRPr lang="en-US"/>
           </a:p>
         </c:txPr>
-        <c:crossAx val="98659328"/>
+        <c:crossAx val="90410368"/>
         <c:crosses val="autoZero"/>
         <c:auto val="1"/>
         <c:lblAlgn val="ctr"/>
         <c:lblOffset val="100"/>
       </c:catAx>
       <c:valAx>
-        <c:axId val="98659328"/>
+        <c:axId val="90410368"/>
         <c:scaling>
           <c:orientation val="minMax"/>
-          <c:max val="8"/>
+          <c:max val="9"/>
           <c:min val="2"/>
         </c:scaling>
         <c:axPos val="l"/>
@@ -400,22 +400,22 @@
                   <a:defRPr sz="1400"/>
                 </a:pPr>
                 <a:r>
-                  <a:rPr lang="el-GR" sz="1800" baseline="0" dirty="0"/>
+                  <a:rPr lang="el-GR" sz="1800" baseline="0"/>
                   <a:t>τ</a:t>
                 </a:r>
                 <a:r>
-                  <a:rPr lang="en-US" sz="1800" baseline="-25000" dirty="0" err="1" smtClean="0"/>
-                  <a:t>min_energy</a:t>
+                  <a:rPr lang="en-US" sz="1800" baseline="-25000"/>
+                  <a:t>min_enery</a:t>
                 </a:r>
                 <a:r>
-                  <a:rPr lang="en-US" sz="1800" baseline="0" dirty="0" smtClean="0"/>
+                  <a:rPr lang="en-US" sz="1800" baseline="0"/>
                   <a:t> </a:t>
                 </a:r>
                 <a:r>
-                  <a:rPr lang="en-US" sz="1400" baseline="0" dirty="0"/>
+                  <a:rPr lang="en-US" sz="1400" baseline="0"/>
                   <a:t>(ns)</a:t>
                 </a:r>
-                <a:endParaRPr lang="en-US" sz="1400" dirty="0"/>
+                <a:endParaRPr lang="en-US" sz="1400"/>
               </a:p>
             </c:rich>
           </c:tx>
@@ -423,7 +423,7 @@
         </c:title>
         <c:numFmt formatCode="General" sourceLinked="1"/>
         <c:tickLblPos val="nextTo"/>
-        <c:crossAx val="98656256"/>
+        <c:crossAx val="90408064"/>
         <c:crosses val="autoZero"/>
         <c:crossBetween val="between"/>
         <c:majorUnit val="1"/>
@@ -435,10 +435,337 @@
         <c:manualLayout>
           <c:xMode val="edge"/>
           <c:yMode val="edge"/>
-          <c:x val="0.12865252012989889"/>
+          <c:x val="0.12865252012989872"/>
           <c:y val="6.8676713424067018E-2"/>
-          <c:w val="0.56322033898305079"/>
-          <c:h val="0.21338478385566056"/>
+          <c:w val="0.62879422859027989"/>
+          <c:h val="0.16627064726449833"/>
+        </c:manualLayout>
+      </c:layout>
+      <c:txPr>
+        <a:bodyPr/>
+        <a:lstStyle/>
+        <a:p>
+          <a:pPr>
+            <a:defRPr sz="1400"/>
+          </a:pPr>
+          <a:endParaRPr lang="en-US"/>
+        </a:p>
+      </c:txPr>
+    </c:legend>
+    <c:plotVisOnly val="1"/>
+  </c:chart>
+  <c:spPr>
+    <a:ln>
+      <a:noFill/>
+    </a:ln>
+  </c:spPr>
+  <c:externalData r:id="rId1"/>
+</c:chartSpace>
+</file>
+
+<file path=ppt/charts/chart2.xml><?xml version="1.0" encoding="utf-8"?>
+<c:chartSpace xmlns:c="http://schemas.openxmlformats.org/drawingml/2006/chart" xmlns:a="http://schemas.openxmlformats.org/drawingml/2006/main" xmlns:r="http://schemas.openxmlformats.org/officeDocument/2006/relationships">
+  <c:lang val="en-US"/>
+  <c:style val="33"/>
+  <c:chart>
+    <c:autoTitleDeleted val="1"/>
+    <c:plotArea>
+      <c:layout>
+        <c:manualLayout>
+          <c:layoutTarget val="inner"/>
+          <c:xMode val="edge"/>
+          <c:yMode val="edge"/>
+          <c:x val="0.21720441795728551"/>
+          <c:y val="5.1400536792815872E-2"/>
+          <c:w val="0.7574123798136162"/>
+          <c:h val="0.64091025155990033"/>
+        </c:manualLayout>
+      </c:layout>
+      <c:lineChart>
+        <c:grouping val="standard"/>
+        <c:ser>
+          <c:idx val="0"/>
+          <c:order val="0"/>
+          <c:tx>
+            <c:strRef>
+              <c:f>Sheet3!$C$20</c:f>
+              <c:strCache>
+                <c:ptCount val="1"/>
+                <c:pt idx="0">
+                  <c:v>In-plane STT-RAM</c:v>
+                </c:pt>
+              </c:strCache>
+            </c:strRef>
+          </c:tx>
+          <c:spPr>
+            <a:ln w="31750"/>
+          </c:spPr>
+          <c:marker>
+            <c:symbol val="diamond"/>
+            <c:size val="5"/>
+          </c:marker>
+          <c:cat>
+            <c:strRef>
+              <c:f>Sheet3!$B$21:$B$26</c:f>
+              <c:strCache>
+                <c:ptCount val="6"/>
+                <c:pt idx="0">
+                  <c:v>16bit</c:v>
+                </c:pt>
+                <c:pt idx="1">
+                  <c:v>32bit</c:v>
+                </c:pt>
+                <c:pt idx="2">
+                  <c:v>64bit</c:v>
+                </c:pt>
+                <c:pt idx="3">
+                  <c:v>128bit</c:v>
+                </c:pt>
+                <c:pt idx="4">
+                  <c:v>256bit</c:v>
+                </c:pt>
+                <c:pt idx="5">
+                  <c:v>512bit</c:v>
+                </c:pt>
+              </c:strCache>
+            </c:strRef>
+          </c:cat>
+          <c:val>
+            <c:numRef>
+              <c:f>Sheet3!$C$21:$C$26</c:f>
+              <c:numCache>
+                <c:formatCode>General</c:formatCode>
+                <c:ptCount val="6"/>
+                <c:pt idx="0">
+                  <c:v>6.1</c:v>
+                </c:pt>
+                <c:pt idx="1">
+                  <c:v>5.5</c:v>
+                </c:pt>
+                <c:pt idx="2">
+                  <c:v>4.8</c:v>
+                </c:pt>
+                <c:pt idx="3">
+                  <c:v>3.8</c:v>
+                </c:pt>
+                <c:pt idx="4">
+                  <c:v>3.1</c:v>
+                </c:pt>
+                <c:pt idx="5">
+                  <c:v>2.6</c:v>
+                </c:pt>
+              </c:numCache>
+            </c:numRef>
+          </c:val>
+        </c:ser>
+        <c:ser>
+          <c:idx val="1"/>
+          <c:order val="1"/>
+          <c:tx>
+            <c:strRef>
+              <c:f>Sheet3!$D$20</c:f>
+              <c:strCache>
+                <c:ptCount val="1"/>
+                <c:pt idx="0">
+                  <c:v>Perpendicular STT-RAM</c:v>
+                </c:pt>
+              </c:strCache>
+            </c:strRef>
+          </c:tx>
+          <c:spPr>
+            <a:ln w="31750">
+              <a:solidFill>
+                <a:schemeClr val="tx1">
+                  <a:lumMod val="95000"/>
+                  <a:lumOff val="5000"/>
+                </a:schemeClr>
+              </a:solidFill>
+            </a:ln>
+          </c:spPr>
+          <c:marker>
+            <c:symbol val="square"/>
+            <c:size val="5"/>
+            <c:spPr>
+              <a:solidFill>
+                <a:schemeClr val="tx1">
+                  <a:lumMod val="95000"/>
+                  <a:lumOff val="5000"/>
+                </a:schemeClr>
+              </a:solidFill>
+            </c:spPr>
+          </c:marker>
+          <c:cat>
+            <c:strRef>
+              <c:f>Sheet3!$B$21:$B$26</c:f>
+              <c:strCache>
+                <c:ptCount val="6"/>
+                <c:pt idx="0">
+                  <c:v>16bit</c:v>
+                </c:pt>
+                <c:pt idx="1">
+                  <c:v>32bit</c:v>
+                </c:pt>
+                <c:pt idx="2">
+                  <c:v>64bit</c:v>
+                </c:pt>
+                <c:pt idx="3">
+                  <c:v>128bit</c:v>
+                </c:pt>
+                <c:pt idx="4">
+                  <c:v>256bit</c:v>
+                </c:pt>
+                <c:pt idx="5">
+                  <c:v>512bit</c:v>
+                </c:pt>
+              </c:strCache>
+            </c:strRef>
+          </c:cat>
+          <c:val>
+            <c:numRef>
+              <c:f>Sheet3!$D$21:$D$26</c:f>
+              <c:numCache>
+                <c:formatCode>General</c:formatCode>
+                <c:ptCount val="6"/>
+                <c:pt idx="0">
+                  <c:v>7.5</c:v>
+                </c:pt>
+                <c:pt idx="1">
+                  <c:v>6.9</c:v>
+                </c:pt>
+                <c:pt idx="2">
+                  <c:v>5.7</c:v>
+                </c:pt>
+                <c:pt idx="3">
+                  <c:v>4.2</c:v>
+                </c:pt>
+                <c:pt idx="4">
+                  <c:v>3.5</c:v>
+                </c:pt>
+                <c:pt idx="5">
+                  <c:v>2.8</c:v>
+                </c:pt>
+              </c:numCache>
+            </c:numRef>
+          </c:val>
+        </c:ser>
+        <c:marker val="1"/>
+        <c:axId val="108987904"/>
+        <c:axId val="108994560"/>
+      </c:lineChart>
+      <c:catAx>
+        <c:axId val="108987904"/>
+        <c:scaling>
+          <c:orientation val="minMax"/>
+        </c:scaling>
+        <c:axPos val="b"/>
+        <c:title>
+          <c:tx>
+            <c:rich>
+              <a:bodyPr/>
+              <a:lstStyle/>
+              <a:p>
+                <a:pPr>
+                  <a:defRPr sz="1400"/>
+                </a:pPr>
+                <a:r>
+                  <a:rPr lang="en-US" sz="1400"/>
+                  <a:t>I/O Width</a:t>
+                </a:r>
+              </a:p>
+            </c:rich>
+          </c:tx>
+          <c:layout>
+            <c:manualLayout>
+              <c:xMode val="edge"/>
+              <c:yMode val="edge"/>
+              <c:x val="0.38343549583867037"/>
+              <c:y val="0.89848247534662307"/>
+            </c:manualLayout>
+          </c:layout>
+        </c:title>
+        <c:majorTickMark val="none"/>
+        <c:tickLblPos val="nextTo"/>
+        <c:txPr>
+          <a:bodyPr/>
+          <a:lstStyle/>
+          <a:p>
+            <a:pPr>
+              <a:defRPr sz="1200"/>
+            </a:pPr>
+            <a:endParaRPr lang="en-US"/>
+          </a:p>
+        </c:txPr>
+        <c:crossAx val="108994560"/>
+        <c:crosses val="autoZero"/>
+        <c:auto val="1"/>
+        <c:lblAlgn val="ctr"/>
+        <c:lblOffset val="100"/>
+      </c:catAx>
+      <c:valAx>
+        <c:axId val="108994560"/>
+        <c:scaling>
+          <c:orientation val="minMax"/>
+          <c:max val="9"/>
+          <c:min val="2"/>
+        </c:scaling>
+        <c:axPos val="l"/>
+        <c:majorGridlines/>
+        <c:title>
+          <c:tx>
+            <c:rich>
+              <a:bodyPr/>
+              <a:lstStyle/>
+              <a:p>
+                <a:pPr>
+                  <a:defRPr sz="1400"/>
+                </a:pPr>
+                <a:r>
+                  <a:rPr lang="el-GR" sz="1800" baseline="0"/>
+                  <a:t>τ</a:t>
+                </a:r>
+                <a:r>
+                  <a:rPr lang="en-US" sz="1800" baseline="-25000"/>
+                  <a:t>min_enery</a:t>
+                </a:r>
+                <a:r>
+                  <a:rPr lang="en-US" sz="1800" baseline="0"/>
+                  <a:t> </a:t>
+                </a:r>
+                <a:r>
+                  <a:rPr lang="en-US" sz="1400" baseline="0"/>
+                  <a:t>(ns)</a:t>
+                </a:r>
+                <a:endParaRPr lang="en-US" sz="1400"/>
+              </a:p>
+            </c:rich>
+          </c:tx>
+          <c:layout>
+            <c:manualLayout>
+              <c:xMode val="edge"/>
+              <c:yMode val="edge"/>
+              <c:x val="1.2861740676250745E-2"/>
+              <c:y val="0.15191347000675931"/>
+            </c:manualLayout>
+          </c:layout>
+        </c:title>
+        <c:numFmt formatCode="General" sourceLinked="1"/>
+        <c:tickLblPos val="nextTo"/>
+        <c:crossAx val="108987904"/>
+        <c:crosses val="autoZero"/>
+        <c:crossBetween val="between"/>
+        <c:majorUnit val="1"/>
+      </c:valAx>
+    </c:plotArea>
+    <c:legend>
+      <c:legendPos val="r"/>
+      <c:layout>
+        <c:manualLayout>
+          <c:xMode val="edge"/>
+          <c:yMode val="edge"/>
+          <c:x val="0.28052900852444507"/>
+          <c:y val="4.9862828265604987E-2"/>
+          <c:w val="0.71333065188136757"/>
+          <c:h val="0.17089829476022547"/>
         </c:manualLayout>
       </c:layout>
       <c:txPr>
@@ -642,10 +969,9 @@
           <a:bodyPr/>
           <a:lstStyle/>
           <a:p>
-            <a:fld id="{C04C1158-67F6-4DB4-B5DB-F07198452297}" type="datetimeFigureOut">
-              <a:rPr lang="en-US" smtClean="0"/>
-              <a:pPr/>
-              <a:t>4/16/2011</a:t>
+            <a:fld id="{95D1014E-49AB-4A1A-AA82-2E98717DDAFF}" type="datetimeFigureOut">
+              <a:rPr lang="en-US" smtClean="0"/>
+              <a:t>4/17/2011</a:t>
             </a:fld>
             <a:endParaRPr lang="en-US"/>
           </a:p>
@@ -685,9 +1011,8 @@
           <a:bodyPr/>
           <a:lstStyle/>
           <a:p>
-            <a:fld id="{5AD18EA6-B8E4-4B24-BB9C-0C6ACECC095B}" type="slidenum">
-              <a:rPr lang="en-US" smtClean="0"/>
-              <a:pPr/>
+            <a:fld id="{4EDDEEF5-55B5-40A9-AD10-1E7EE6FB0CF5}" type="slidenum">
+              <a:rPr lang="en-US" smtClean="0"/>
               <a:t>‹#›</a:t>
             </a:fld>
             <a:endParaRPr lang="en-US"/>
@@ -809,10 +1134,9 @@
           <a:bodyPr/>
           <a:lstStyle/>
           <a:p>
-            <a:fld id="{C04C1158-67F6-4DB4-B5DB-F07198452297}" type="datetimeFigureOut">
-              <a:rPr lang="en-US" smtClean="0"/>
-              <a:pPr/>
-              <a:t>4/16/2011</a:t>
+            <a:fld id="{95D1014E-49AB-4A1A-AA82-2E98717DDAFF}" type="datetimeFigureOut">
+              <a:rPr lang="en-US" smtClean="0"/>
+              <a:t>4/17/2011</a:t>
             </a:fld>
             <a:endParaRPr lang="en-US"/>
           </a:p>
@@ -852,9 +1176,8 @@
           <a:bodyPr/>
           <a:lstStyle/>
           <a:p>
-            <a:fld id="{5AD18EA6-B8E4-4B24-BB9C-0C6ACECC095B}" type="slidenum">
-              <a:rPr lang="en-US" smtClean="0"/>
-              <a:pPr/>
+            <a:fld id="{4EDDEEF5-55B5-40A9-AD10-1E7EE6FB0CF5}" type="slidenum">
+              <a:rPr lang="en-US" smtClean="0"/>
               <a:t>‹#›</a:t>
             </a:fld>
             <a:endParaRPr lang="en-US"/>
@@ -986,10 +1309,9 @@
           <a:bodyPr/>
           <a:lstStyle/>
           <a:p>
-            <a:fld id="{C04C1158-67F6-4DB4-B5DB-F07198452297}" type="datetimeFigureOut">
-              <a:rPr lang="en-US" smtClean="0"/>
-              <a:pPr/>
-              <a:t>4/16/2011</a:t>
+            <a:fld id="{95D1014E-49AB-4A1A-AA82-2E98717DDAFF}" type="datetimeFigureOut">
+              <a:rPr lang="en-US" smtClean="0"/>
+              <a:t>4/17/2011</a:t>
             </a:fld>
             <a:endParaRPr lang="en-US"/>
           </a:p>
@@ -1029,9 +1351,8 @@
           <a:bodyPr/>
           <a:lstStyle/>
           <a:p>
-            <a:fld id="{5AD18EA6-B8E4-4B24-BB9C-0C6ACECC095B}" type="slidenum">
-              <a:rPr lang="en-US" smtClean="0"/>
-              <a:pPr/>
+            <a:fld id="{4EDDEEF5-55B5-40A9-AD10-1E7EE6FB0CF5}" type="slidenum">
+              <a:rPr lang="en-US" smtClean="0"/>
               <a:t>‹#›</a:t>
             </a:fld>
             <a:endParaRPr lang="en-US"/>
@@ -1153,10 +1474,9 @@
           <a:bodyPr/>
           <a:lstStyle/>
           <a:p>
-            <a:fld id="{C04C1158-67F6-4DB4-B5DB-F07198452297}" type="datetimeFigureOut">
-              <a:rPr lang="en-US" smtClean="0"/>
-              <a:pPr/>
-              <a:t>4/16/2011</a:t>
+            <a:fld id="{95D1014E-49AB-4A1A-AA82-2E98717DDAFF}" type="datetimeFigureOut">
+              <a:rPr lang="en-US" smtClean="0"/>
+              <a:t>4/17/2011</a:t>
             </a:fld>
             <a:endParaRPr lang="en-US"/>
           </a:p>
@@ -1196,9 +1516,8 @@
           <a:bodyPr/>
           <a:lstStyle/>
           <a:p>
-            <a:fld id="{5AD18EA6-B8E4-4B24-BB9C-0C6ACECC095B}" type="slidenum">
-              <a:rPr lang="en-US" smtClean="0"/>
-              <a:pPr/>
+            <a:fld id="{4EDDEEF5-55B5-40A9-AD10-1E7EE6FB0CF5}" type="slidenum">
+              <a:rPr lang="en-US" smtClean="0"/>
               <a:t>‹#›</a:t>
             </a:fld>
             <a:endParaRPr lang="en-US"/>
@@ -1396,10 +1715,9 @@
           <a:bodyPr/>
           <a:lstStyle/>
           <a:p>
-            <a:fld id="{C04C1158-67F6-4DB4-B5DB-F07198452297}" type="datetimeFigureOut">
-              <a:rPr lang="en-US" smtClean="0"/>
-              <a:pPr/>
-              <a:t>4/16/2011</a:t>
+            <a:fld id="{95D1014E-49AB-4A1A-AA82-2E98717DDAFF}" type="datetimeFigureOut">
+              <a:rPr lang="en-US" smtClean="0"/>
+              <a:t>4/17/2011</a:t>
             </a:fld>
             <a:endParaRPr lang="en-US"/>
           </a:p>
@@ -1439,9 +1757,8 @@
           <a:bodyPr/>
           <a:lstStyle/>
           <a:p>
-            <a:fld id="{5AD18EA6-B8E4-4B24-BB9C-0C6ACECC095B}" type="slidenum">
-              <a:rPr lang="en-US" smtClean="0"/>
-              <a:pPr/>
+            <a:fld id="{4EDDEEF5-55B5-40A9-AD10-1E7EE6FB0CF5}" type="slidenum">
+              <a:rPr lang="en-US" smtClean="0"/>
               <a:t>‹#›</a:t>
             </a:fld>
             <a:endParaRPr lang="en-US"/>
@@ -1681,10 +1998,9 @@
           <a:bodyPr/>
           <a:lstStyle/>
           <a:p>
-            <a:fld id="{C04C1158-67F6-4DB4-B5DB-F07198452297}" type="datetimeFigureOut">
-              <a:rPr lang="en-US" smtClean="0"/>
-              <a:pPr/>
-              <a:t>4/16/2011</a:t>
+            <a:fld id="{95D1014E-49AB-4A1A-AA82-2E98717DDAFF}" type="datetimeFigureOut">
+              <a:rPr lang="en-US" smtClean="0"/>
+              <a:t>4/17/2011</a:t>
             </a:fld>
             <a:endParaRPr lang="en-US"/>
           </a:p>
@@ -1724,9 +2040,8 @@
           <a:bodyPr/>
           <a:lstStyle/>
           <a:p>
-            <a:fld id="{5AD18EA6-B8E4-4B24-BB9C-0C6ACECC095B}" type="slidenum">
-              <a:rPr lang="en-US" smtClean="0"/>
-              <a:pPr/>
+            <a:fld id="{4EDDEEF5-55B5-40A9-AD10-1E7EE6FB0CF5}" type="slidenum">
+              <a:rPr lang="en-US" smtClean="0"/>
               <a:t>‹#›</a:t>
             </a:fld>
             <a:endParaRPr lang="en-US"/>
@@ -2100,10 +2415,9 @@
           <a:bodyPr/>
           <a:lstStyle/>
           <a:p>
-            <a:fld id="{C04C1158-67F6-4DB4-B5DB-F07198452297}" type="datetimeFigureOut">
-              <a:rPr lang="en-US" smtClean="0"/>
-              <a:pPr/>
-              <a:t>4/16/2011</a:t>
+            <a:fld id="{95D1014E-49AB-4A1A-AA82-2E98717DDAFF}" type="datetimeFigureOut">
+              <a:rPr lang="en-US" smtClean="0"/>
+              <a:t>4/17/2011</a:t>
             </a:fld>
             <a:endParaRPr lang="en-US"/>
           </a:p>
@@ -2143,9 +2457,8 @@
           <a:bodyPr/>
           <a:lstStyle/>
           <a:p>
-            <a:fld id="{5AD18EA6-B8E4-4B24-BB9C-0C6ACECC095B}" type="slidenum">
-              <a:rPr lang="en-US" smtClean="0"/>
-              <a:pPr/>
+            <a:fld id="{4EDDEEF5-55B5-40A9-AD10-1E7EE6FB0CF5}" type="slidenum">
+              <a:rPr lang="en-US" smtClean="0"/>
               <a:t>‹#›</a:t>
             </a:fld>
             <a:endParaRPr lang="en-US"/>
@@ -2215,10 +2528,9 @@
           <a:bodyPr/>
           <a:lstStyle/>
           <a:p>
-            <a:fld id="{C04C1158-67F6-4DB4-B5DB-F07198452297}" type="datetimeFigureOut">
-              <a:rPr lang="en-US" smtClean="0"/>
-              <a:pPr/>
-              <a:t>4/16/2011</a:t>
+            <a:fld id="{95D1014E-49AB-4A1A-AA82-2E98717DDAFF}" type="datetimeFigureOut">
+              <a:rPr lang="en-US" smtClean="0"/>
+              <a:t>4/17/2011</a:t>
             </a:fld>
             <a:endParaRPr lang="en-US"/>
           </a:p>
@@ -2258,9 +2570,8 @@
           <a:bodyPr/>
           <a:lstStyle/>
           <a:p>
-            <a:fld id="{5AD18EA6-B8E4-4B24-BB9C-0C6ACECC095B}" type="slidenum">
-              <a:rPr lang="en-US" smtClean="0"/>
-              <a:pPr/>
+            <a:fld id="{4EDDEEF5-55B5-40A9-AD10-1E7EE6FB0CF5}" type="slidenum">
+              <a:rPr lang="en-US" smtClean="0"/>
               <a:t>‹#›</a:t>
             </a:fld>
             <a:endParaRPr lang="en-US"/>
@@ -2307,10 +2618,9 @@
           <a:bodyPr/>
           <a:lstStyle/>
           <a:p>
-            <a:fld id="{C04C1158-67F6-4DB4-B5DB-F07198452297}" type="datetimeFigureOut">
-              <a:rPr lang="en-US" smtClean="0"/>
-              <a:pPr/>
-              <a:t>4/16/2011</a:t>
+            <a:fld id="{95D1014E-49AB-4A1A-AA82-2E98717DDAFF}" type="datetimeFigureOut">
+              <a:rPr lang="en-US" smtClean="0"/>
+              <a:t>4/17/2011</a:t>
             </a:fld>
             <a:endParaRPr lang="en-US"/>
           </a:p>
@@ -2350,9 +2660,8 @@
           <a:bodyPr/>
           <a:lstStyle/>
           <a:p>
-            <a:fld id="{5AD18EA6-B8E4-4B24-BB9C-0C6ACECC095B}" type="slidenum">
-              <a:rPr lang="en-US" smtClean="0"/>
-              <a:pPr/>
+            <a:fld id="{4EDDEEF5-55B5-40A9-AD10-1E7EE6FB0CF5}" type="slidenum">
+              <a:rPr lang="en-US" smtClean="0"/>
               <a:t>‹#›</a:t>
             </a:fld>
             <a:endParaRPr lang="en-US"/>
@@ -2581,10 +2890,9 @@
           <a:bodyPr/>
           <a:lstStyle/>
           <a:p>
-            <a:fld id="{C04C1158-67F6-4DB4-B5DB-F07198452297}" type="datetimeFigureOut">
-              <a:rPr lang="en-US" smtClean="0"/>
-              <a:pPr/>
-              <a:t>4/16/2011</a:t>
+            <a:fld id="{95D1014E-49AB-4A1A-AA82-2E98717DDAFF}" type="datetimeFigureOut">
+              <a:rPr lang="en-US" smtClean="0"/>
+              <a:t>4/17/2011</a:t>
             </a:fld>
             <a:endParaRPr lang="en-US"/>
           </a:p>
@@ -2624,9 +2932,8 @@
           <a:bodyPr/>
           <a:lstStyle/>
           <a:p>
-            <a:fld id="{5AD18EA6-B8E4-4B24-BB9C-0C6ACECC095B}" type="slidenum">
-              <a:rPr lang="en-US" smtClean="0"/>
-              <a:pPr/>
+            <a:fld id="{4EDDEEF5-55B5-40A9-AD10-1E7EE6FB0CF5}" type="slidenum">
+              <a:rPr lang="en-US" smtClean="0"/>
               <a:t>‹#›</a:t>
             </a:fld>
             <a:endParaRPr lang="en-US"/>
@@ -2831,10 +3138,9 @@
           <a:bodyPr/>
           <a:lstStyle/>
           <a:p>
-            <a:fld id="{C04C1158-67F6-4DB4-B5DB-F07198452297}" type="datetimeFigureOut">
-              <a:rPr lang="en-US" smtClean="0"/>
-              <a:pPr/>
-              <a:t>4/16/2011</a:t>
+            <a:fld id="{95D1014E-49AB-4A1A-AA82-2E98717DDAFF}" type="datetimeFigureOut">
+              <a:rPr lang="en-US" smtClean="0"/>
+              <a:t>4/17/2011</a:t>
             </a:fld>
             <a:endParaRPr lang="en-US"/>
           </a:p>
@@ -2874,9 +3180,8 @@
           <a:bodyPr/>
           <a:lstStyle/>
           <a:p>
-            <a:fld id="{5AD18EA6-B8E4-4B24-BB9C-0C6ACECC095B}" type="slidenum">
-              <a:rPr lang="en-US" smtClean="0"/>
-              <a:pPr/>
+            <a:fld id="{4EDDEEF5-55B5-40A9-AD10-1E7EE6FB0CF5}" type="slidenum">
+              <a:rPr lang="en-US" smtClean="0"/>
               <a:t>‹#›</a:t>
             </a:fld>
             <a:endParaRPr lang="en-US"/>
@@ -3041,10 +3346,9 @@
             </a:lvl1pPr>
           </a:lstStyle>
           <a:p>
-            <a:fld id="{C04C1158-67F6-4DB4-B5DB-F07198452297}" type="datetimeFigureOut">
-              <a:rPr lang="en-US" smtClean="0"/>
-              <a:pPr/>
-              <a:t>4/16/2011</a:t>
+            <a:fld id="{95D1014E-49AB-4A1A-AA82-2E98717DDAFF}" type="datetimeFigureOut">
+              <a:rPr lang="en-US" smtClean="0"/>
+              <a:t>4/17/2011</a:t>
             </a:fld>
             <a:endParaRPr lang="en-US"/>
           </a:p>
@@ -3120,9 +3424,8 @@
             </a:lvl1pPr>
           </a:lstStyle>
           <a:p>
-            <a:fld id="{5AD18EA6-B8E4-4B24-BB9C-0C6ACECC095B}" type="slidenum">
-              <a:rPr lang="en-US" smtClean="0"/>
-              <a:pPr/>
+            <a:fld id="{4EDDEEF5-55B5-40A9-AD10-1E7EE6FB0CF5}" type="slidenum">
+              <a:rPr lang="en-US" smtClean="0"/>
               <a:t>‹#›</a:t>
             </a:fld>
             <a:endParaRPr lang="en-US"/>
@@ -3417,13 +3720,13 @@
       </p:grpSpPr>
       <p:graphicFrame>
         <p:nvGraphicFramePr>
-          <p:cNvPr id="5" name="Chart 4"/>
+          <p:cNvPr id="4" name="Chart 3"/>
           <p:cNvGraphicFramePr/>
           <p:nvPr/>
         </p:nvGraphicFramePr>
         <p:xfrm>
           <a:off x="0" y="0"/>
-          <a:ext cx="4133850" cy="2867025"/>
+          <a:ext cx="3486150" cy="2695575"/>
         </p:xfrm>
         <a:graphic>
           <a:graphicData uri="http://schemas.openxmlformats.org/drawingml/2006/chart">
@@ -3431,6 +3734,293 @@
           </a:graphicData>
         </a:graphic>
       </p:graphicFrame>
+      <p:graphicFrame>
+        <p:nvGraphicFramePr>
+          <p:cNvPr id="5" name="Chart 4"/>
+          <p:cNvGraphicFramePr/>
+          <p:nvPr/>
+        </p:nvGraphicFramePr>
+        <p:xfrm>
+          <a:off x="3248025" y="19051"/>
+          <a:ext cx="2962274" cy="2695574"/>
+        </p:xfrm>
+        <a:graphic>
+          <a:graphicData uri="http://schemas.openxmlformats.org/drawingml/2006/chart">
+            <c:chart xmlns:c="http://schemas.openxmlformats.org/drawingml/2006/chart" xmlns:r="http://schemas.openxmlformats.org/officeDocument/2006/relationships" r:id="rId3"/>
+          </a:graphicData>
+        </a:graphic>
+      </p:graphicFrame>
+      <p:sp>
+        <p:nvSpPr>
+          <p:cNvPr id="6" name="TextBox 3"/>
+          <p:cNvSpPr txBox="1"/>
+          <p:nvPr/>
+        </p:nvSpPr>
+        <p:spPr>
+          <a:xfrm>
+            <a:off x="1524000" y="2667000"/>
+            <a:ext cx="628650" cy="266700"/>
+          </a:xfrm>
+          <a:prstGeom prst="rect">
+            <a:avLst/>
+          </a:prstGeom>
+          <a:noFill/>
+          <a:ln w="9525" cmpd="sng">
+            <a:noFill/>
+          </a:ln>
+        </p:spPr>
+        <p:style>
+          <a:lnRef idx="0">
+            <a:scrgbClr r="0" g="0" b="0"/>
+          </a:lnRef>
+          <a:fillRef idx="0">
+            <a:scrgbClr r="0" g="0" b="0"/>
+          </a:fillRef>
+          <a:effectRef idx="0">
+            <a:scrgbClr r="0" g="0" b="0"/>
+          </a:effectRef>
+          <a:fontRef idx="minor">
+            <a:schemeClr val="dk1"/>
+          </a:fontRef>
+        </p:style>
+        <p:txBody>
+          <a:bodyPr wrap="square" rtlCol="0" anchor="t"/>
+          <a:lstStyle>
+            <a:lvl1pPr marL="0" indent="0">
+              <a:defRPr sz="1100">
+                <a:solidFill>
+                  <a:schemeClr val="dk1"/>
+                </a:solidFill>
+                <a:latin typeface="+mn-lt"/>
+                <a:ea typeface="+mn-ea"/>
+                <a:cs typeface="+mn-cs"/>
+              </a:defRPr>
+            </a:lvl1pPr>
+            <a:lvl2pPr marL="457200" indent="0">
+              <a:defRPr sz="1100">
+                <a:solidFill>
+                  <a:schemeClr val="dk1"/>
+                </a:solidFill>
+                <a:latin typeface="+mn-lt"/>
+                <a:ea typeface="+mn-ea"/>
+                <a:cs typeface="+mn-cs"/>
+              </a:defRPr>
+            </a:lvl2pPr>
+            <a:lvl3pPr marL="914400" indent="0">
+              <a:defRPr sz="1100">
+                <a:solidFill>
+                  <a:schemeClr val="dk1"/>
+                </a:solidFill>
+                <a:latin typeface="+mn-lt"/>
+                <a:ea typeface="+mn-ea"/>
+                <a:cs typeface="+mn-cs"/>
+              </a:defRPr>
+            </a:lvl3pPr>
+            <a:lvl4pPr marL="1371600" indent="0">
+              <a:defRPr sz="1100">
+                <a:solidFill>
+                  <a:schemeClr val="dk1"/>
+                </a:solidFill>
+                <a:latin typeface="+mn-lt"/>
+                <a:ea typeface="+mn-ea"/>
+                <a:cs typeface="+mn-cs"/>
+              </a:defRPr>
+            </a:lvl4pPr>
+            <a:lvl5pPr marL="1828800" indent="0">
+              <a:defRPr sz="1100">
+                <a:solidFill>
+                  <a:schemeClr val="dk1"/>
+                </a:solidFill>
+                <a:latin typeface="+mn-lt"/>
+                <a:ea typeface="+mn-ea"/>
+                <a:cs typeface="+mn-cs"/>
+              </a:defRPr>
+            </a:lvl5pPr>
+            <a:lvl6pPr marL="2286000" indent="0">
+              <a:defRPr sz="1100">
+                <a:solidFill>
+                  <a:schemeClr val="dk1"/>
+                </a:solidFill>
+                <a:latin typeface="+mn-lt"/>
+                <a:ea typeface="+mn-ea"/>
+                <a:cs typeface="+mn-cs"/>
+              </a:defRPr>
+            </a:lvl6pPr>
+            <a:lvl7pPr marL="2743200" indent="0">
+              <a:defRPr sz="1100">
+                <a:solidFill>
+                  <a:schemeClr val="dk1"/>
+                </a:solidFill>
+                <a:latin typeface="+mn-lt"/>
+                <a:ea typeface="+mn-ea"/>
+                <a:cs typeface="+mn-cs"/>
+              </a:defRPr>
+            </a:lvl7pPr>
+            <a:lvl8pPr marL="3200400" indent="0">
+              <a:defRPr sz="1100">
+                <a:solidFill>
+                  <a:schemeClr val="dk1"/>
+                </a:solidFill>
+                <a:latin typeface="+mn-lt"/>
+                <a:ea typeface="+mn-ea"/>
+                <a:cs typeface="+mn-cs"/>
+              </a:defRPr>
+            </a:lvl8pPr>
+            <a:lvl9pPr marL="3657600" indent="0">
+              <a:defRPr sz="1100">
+                <a:solidFill>
+                  <a:schemeClr val="dk1"/>
+                </a:solidFill>
+                <a:latin typeface="+mn-lt"/>
+                <a:ea typeface="+mn-ea"/>
+                <a:cs typeface="+mn-cs"/>
+              </a:defRPr>
+            </a:lvl9pPr>
+          </a:lstStyle>
+          <a:p>
+            <a:r>
+              <a:rPr lang="en-US" sz="1400" b="1" dirty="0"/>
+              <a:t>(a)</a:t>
+            </a:r>
+          </a:p>
+        </p:txBody>
+      </p:sp>
+      <p:sp>
+        <p:nvSpPr>
+          <p:cNvPr id="7" name="TextBox 3"/>
+          <p:cNvSpPr txBox="1"/>
+          <p:nvPr/>
+        </p:nvSpPr>
+        <p:spPr>
+          <a:xfrm>
+            <a:off x="4648200" y="2667000"/>
+            <a:ext cx="628650" cy="266700"/>
+          </a:xfrm>
+          <a:prstGeom prst="rect">
+            <a:avLst/>
+          </a:prstGeom>
+          <a:noFill/>
+          <a:ln w="9525" cmpd="sng">
+            <a:noFill/>
+          </a:ln>
+        </p:spPr>
+        <p:style>
+          <a:lnRef idx="0">
+            <a:scrgbClr r="0" g="0" b="0"/>
+          </a:lnRef>
+          <a:fillRef idx="0">
+            <a:scrgbClr r="0" g="0" b="0"/>
+          </a:fillRef>
+          <a:effectRef idx="0">
+            <a:scrgbClr r="0" g="0" b="0"/>
+          </a:effectRef>
+          <a:fontRef idx="minor">
+            <a:schemeClr val="dk1"/>
+          </a:fontRef>
+        </p:style>
+        <p:txBody>
+          <a:bodyPr wrap="square" rtlCol="0" anchor="t"/>
+          <a:lstStyle>
+            <a:lvl1pPr marL="0" indent="0">
+              <a:defRPr sz="1100">
+                <a:solidFill>
+                  <a:schemeClr val="dk1"/>
+                </a:solidFill>
+                <a:latin typeface="+mn-lt"/>
+                <a:ea typeface="+mn-ea"/>
+                <a:cs typeface="+mn-cs"/>
+              </a:defRPr>
+            </a:lvl1pPr>
+            <a:lvl2pPr marL="457200" indent="0">
+              <a:defRPr sz="1100">
+                <a:solidFill>
+                  <a:schemeClr val="dk1"/>
+                </a:solidFill>
+                <a:latin typeface="+mn-lt"/>
+                <a:ea typeface="+mn-ea"/>
+                <a:cs typeface="+mn-cs"/>
+              </a:defRPr>
+            </a:lvl2pPr>
+            <a:lvl3pPr marL="914400" indent="0">
+              <a:defRPr sz="1100">
+                <a:solidFill>
+                  <a:schemeClr val="dk1"/>
+                </a:solidFill>
+                <a:latin typeface="+mn-lt"/>
+                <a:ea typeface="+mn-ea"/>
+                <a:cs typeface="+mn-cs"/>
+              </a:defRPr>
+            </a:lvl3pPr>
+            <a:lvl4pPr marL="1371600" indent="0">
+              <a:defRPr sz="1100">
+                <a:solidFill>
+                  <a:schemeClr val="dk1"/>
+                </a:solidFill>
+                <a:latin typeface="+mn-lt"/>
+                <a:ea typeface="+mn-ea"/>
+                <a:cs typeface="+mn-cs"/>
+              </a:defRPr>
+            </a:lvl4pPr>
+            <a:lvl5pPr marL="1828800" indent="0">
+              <a:defRPr sz="1100">
+                <a:solidFill>
+                  <a:schemeClr val="dk1"/>
+                </a:solidFill>
+                <a:latin typeface="+mn-lt"/>
+                <a:ea typeface="+mn-ea"/>
+                <a:cs typeface="+mn-cs"/>
+              </a:defRPr>
+            </a:lvl5pPr>
+            <a:lvl6pPr marL="2286000" indent="0">
+              <a:defRPr sz="1100">
+                <a:solidFill>
+                  <a:schemeClr val="dk1"/>
+                </a:solidFill>
+                <a:latin typeface="+mn-lt"/>
+                <a:ea typeface="+mn-ea"/>
+                <a:cs typeface="+mn-cs"/>
+              </a:defRPr>
+            </a:lvl6pPr>
+            <a:lvl7pPr marL="2743200" indent="0">
+              <a:defRPr sz="1100">
+                <a:solidFill>
+                  <a:schemeClr val="dk1"/>
+                </a:solidFill>
+                <a:latin typeface="+mn-lt"/>
+                <a:ea typeface="+mn-ea"/>
+                <a:cs typeface="+mn-cs"/>
+              </a:defRPr>
+            </a:lvl7pPr>
+            <a:lvl8pPr marL="3200400" indent="0">
+              <a:defRPr sz="1100">
+                <a:solidFill>
+                  <a:schemeClr val="dk1"/>
+                </a:solidFill>
+                <a:latin typeface="+mn-lt"/>
+                <a:ea typeface="+mn-ea"/>
+                <a:cs typeface="+mn-cs"/>
+              </a:defRPr>
+            </a:lvl8pPr>
+            <a:lvl9pPr marL="3657600" indent="0">
+              <a:defRPr sz="1100">
+                <a:solidFill>
+                  <a:schemeClr val="dk1"/>
+                </a:solidFill>
+                <a:latin typeface="+mn-lt"/>
+                <a:ea typeface="+mn-ea"/>
+                <a:cs typeface="+mn-cs"/>
+              </a:defRPr>
+            </a:lvl9pPr>
+          </a:lstStyle>
+          <a:p>
+            <a:r>
+              <a:rPr lang="en-US" sz="1400" b="1" dirty="0" smtClean="0"/>
+              <a:t>(b)</a:t>
+            </a:r>
+            <a:endParaRPr lang="en-US" sz="1400" b="1" dirty="0"/>
+          </a:p>
+        </p:txBody>
+      </p:sp>
     </p:spTree>
   </p:cSld>
   <p:clrMapOvr>

</xml_diff>